<commit_message>
presentation update - 2
</commit_message>
<xml_diff>
--- a/NETMouse - .NET release/Presentations/ABCNET как альтернатива PABCSystem.pptx
+++ b/NETMouse - .NET release/Presentations/ABCNET как альтернатива PABCSystem.pptx
@@ -6268,6 +6268,53 @@
           </a:p>
         </p:txBody>
       </p:sp>
+      <p:sp>
+        <p:nvSpPr>
+          <p:cNvPr id="4" name="TextBox 3">
+            <a:extLst>
+              <a:ext uri="{FF2B5EF4-FFF2-40B4-BE49-F238E27FC236}">
+                <a16:creationId xmlns:a16="http://schemas.microsoft.com/office/drawing/2014/main" id="{93E2A6DF-ADFB-44AD-9F73-7E9A9A2714B3}"/>
+              </a:ext>
+            </a:extLst>
+          </p:cNvPr>
+          <p:cNvSpPr txBox="1"/>
+          <p:nvPr/>
+        </p:nvSpPr>
+        <p:spPr>
+          <a:xfrm>
+            <a:off x="0" y="6434138"/>
+            <a:ext cx="2292824" cy="369332"/>
+          </a:xfrm>
+          <a:prstGeom prst="rect">
+            <a:avLst/>
+          </a:prstGeom>
+          <a:noFill/>
+        </p:spPr>
+        <p:txBody>
+          <a:bodyPr wrap="square" rtlCol="0">
+            <a:spAutoFit/>
+          </a:bodyPr>
+          <a:lstStyle/>
+          <a:p>
+            <a:r>
+              <a:rPr lang="en-US" dirty="0" err="1">
+                <a:solidFill>
+                  <a:srgbClr val="99CCFF"/>
+                </a:solidFill>
+              </a:rPr>
+              <a:t>NETMouse</a:t>
+            </a:r>
+            <a:r>
+              <a:rPr lang="en-US" dirty="0">
+                <a:solidFill>
+                  <a:srgbClr val="99CCFF"/>
+                </a:solidFill>
+              </a:rPr>
+              <a:t> projects ©</a:t>
+            </a:r>
+          </a:p>
+        </p:txBody>
+      </p:sp>
     </p:spTree>
     <p:extLst>
       <p:ext uri="{BB962C8B-B14F-4D97-AF65-F5344CB8AC3E}">
@@ -6278,13 +6325,13 @@
   <p:clrMapOvr>
     <a:masterClrMapping/>
   </p:clrMapOvr>
-  <mc:AlternateContent xmlns:mc="http://schemas.openxmlformats.org/markup-compatibility/2006">
-    <mc:Choice xmlns:p14="http://schemas.microsoft.com/office/powerpoint/2010/main" Requires="p14">
+  <mc:AlternateContent xmlns:mc="http://schemas.openxmlformats.org/markup-compatibility/2006" xmlns:p14="http://schemas.microsoft.com/office/powerpoint/2010/main">
+    <mc:Choice Requires="p14">
       <p:transition spd="slow" p14:dur="1600">
         <p:blinds dir="vert"/>
       </p:transition>
     </mc:Choice>
-    <mc:Fallback>
+    <mc:Fallback xmlns="">
       <p:transition spd="slow">
         <p:blinds dir="vert"/>
       </p:transition>
@@ -6643,7 +6690,7 @@
                   </a:outerShdw>
                 </a:effectLst>
               </a:rPr>
-              <a:t>Пишите мне на почту (</a:t>
+              <a:t>Пишите нам на почту (</a:t>
             </a:r>
             <a:r>
               <a:rPr lang="en-US" dirty="0">
@@ -6662,7 +6709,7 @@
                   </a:extLst>
                 </a:hlinkClick>
               </a:rPr>
-              <a:t>MrFresnel@yandex.ru</a:t>
+              <a:t>NETMouseProjects@yandex.ru</a:t>
             </a:r>
             <a:r>
               <a:rPr lang="ru-RU" dirty="0">
@@ -7057,6 +7104,53 @@
                 </a:effectLst>
               </a:rPr>
               <a:t>Next</a:t>
+            </a:r>
+          </a:p>
+        </p:txBody>
+      </p:sp>
+      <p:sp>
+        <p:nvSpPr>
+          <p:cNvPr id="7" name="TextBox 6">
+            <a:extLst>
+              <a:ext uri="{FF2B5EF4-FFF2-40B4-BE49-F238E27FC236}">
+                <a16:creationId xmlns:a16="http://schemas.microsoft.com/office/drawing/2014/main" id="{9DE3917F-DDBA-463E-93F9-CD78175EF4F2}"/>
+              </a:ext>
+            </a:extLst>
+          </p:cNvPr>
+          <p:cNvSpPr txBox="1"/>
+          <p:nvPr/>
+        </p:nvSpPr>
+        <p:spPr>
+          <a:xfrm>
+            <a:off x="0" y="6434138"/>
+            <a:ext cx="2292824" cy="369332"/>
+          </a:xfrm>
+          <a:prstGeom prst="rect">
+            <a:avLst/>
+          </a:prstGeom>
+          <a:noFill/>
+        </p:spPr>
+        <p:txBody>
+          <a:bodyPr wrap="square" rtlCol="0">
+            <a:spAutoFit/>
+          </a:bodyPr>
+          <a:lstStyle/>
+          <a:p>
+            <a:r>
+              <a:rPr lang="en-US" dirty="0" err="1">
+                <a:solidFill>
+                  <a:srgbClr val="99CCFF"/>
+                </a:solidFill>
+              </a:rPr>
+              <a:t>NETMouse</a:t>
+            </a:r>
+            <a:r>
+              <a:rPr lang="en-US" dirty="0">
+                <a:solidFill>
+                  <a:srgbClr val="99CCFF"/>
+                </a:solidFill>
+              </a:rPr>
+              <a:t> projects ©</a:t>
             </a:r>
           </a:p>
         </p:txBody>
@@ -7773,6 +7867,53 @@
           </a:p>
         </p:txBody>
       </p:sp>
+      <p:sp>
+        <p:nvSpPr>
+          <p:cNvPr id="4" name="TextBox 3">
+            <a:extLst>
+              <a:ext uri="{FF2B5EF4-FFF2-40B4-BE49-F238E27FC236}">
+                <a16:creationId xmlns:a16="http://schemas.microsoft.com/office/drawing/2014/main" id="{1BD7BD89-CFE3-4249-A409-BB6163B59FFC}"/>
+              </a:ext>
+            </a:extLst>
+          </p:cNvPr>
+          <p:cNvSpPr txBox="1"/>
+          <p:nvPr/>
+        </p:nvSpPr>
+        <p:spPr>
+          <a:xfrm>
+            <a:off x="0" y="6434138"/>
+            <a:ext cx="2292824" cy="369332"/>
+          </a:xfrm>
+          <a:prstGeom prst="rect">
+            <a:avLst/>
+          </a:prstGeom>
+          <a:noFill/>
+        </p:spPr>
+        <p:txBody>
+          <a:bodyPr wrap="square" rtlCol="0">
+            <a:spAutoFit/>
+          </a:bodyPr>
+          <a:lstStyle/>
+          <a:p>
+            <a:r>
+              <a:rPr lang="en-US" dirty="0" err="1">
+                <a:solidFill>
+                  <a:srgbClr val="99CCFF"/>
+                </a:solidFill>
+              </a:rPr>
+              <a:t>NETMouse</a:t>
+            </a:r>
+            <a:r>
+              <a:rPr lang="en-US" dirty="0">
+                <a:solidFill>
+                  <a:srgbClr val="99CCFF"/>
+                </a:solidFill>
+              </a:rPr>
+              <a:t> projects ©</a:t>
+            </a:r>
+          </a:p>
+        </p:txBody>
+      </p:sp>
     </p:spTree>
     <p:extLst>
       <p:ext uri="{BB962C8B-B14F-4D97-AF65-F5344CB8AC3E}">
@@ -8475,6 +8616,53 @@
                 </a:effectLst>
               </a:rPr>
               <a:t>Next</a:t>
+            </a:r>
+          </a:p>
+        </p:txBody>
+      </p:sp>
+      <p:sp>
+        <p:nvSpPr>
+          <p:cNvPr id="6" name="TextBox 5">
+            <a:extLst>
+              <a:ext uri="{FF2B5EF4-FFF2-40B4-BE49-F238E27FC236}">
+                <a16:creationId xmlns:a16="http://schemas.microsoft.com/office/drawing/2014/main" id="{23095613-B9F2-467F-B25A-D6C945DA5E2E}"/>
+              </a:ext>
+            </a:extLst>
+          </p:cNvPr>
+          <p:cNvSpPr txBox="1"/>
+          <p:nvPr/>
+        </p:nvSpPr>
+        <p:spPr>
+          <a:xfrm>
+            <a:off x="0" y="6434138"/>
+            <a:ext cx="2292824" cy="369332"/>
+          </a:xfrm>
+          <a:prstGeom prst="rect">
+            <a:avLst/>
+          </a:prstGeom>
+          <a:noFill/>
+        </p:spPr>
+        <p:txBody>
+          <a:bodyPr wrap="square" rtlCol="0">
+            <a:spAutoFit/>
+          </a:bodyPr>
+          <a:lstStyle/>
+          <a:p>
+            <a:r>
+              <a:rPr lang="en-US" dirty="0" err="1">
+                <a:solidFill>
+                  <a:srgbClr val="99CCFF"/>
+                </a:solidFill>
+              </a:rPr>
+              <a:t>NETMouse</a:t>
+            </a:r>
+            <a:r>
+              <a:rPr lang="en-US" dirty="0">
+                <a:solidFill>
+                  <a:srgbClr val="99CCFF"/>
+                </a:solidFill>
+              </a:rPr>
+              <a:t> projects ©</a:t>
             </a:r>
           </a:p>
         </p:txBody>
@@ -8962,7 +9150,7 @@
                   </a:outerShdw>
                 </a:effectLst>
               </a:rPr>
-              <a:t>лишь возможно использовать вне его изначальной среды - </a:t>
+              <a:t>лишь возможно использовать вне его изначальной среды </a:t>
             </a:r>
             <a:r>
               <a:rPr lang="en-US" b="1" dirty="0">
@@ -9390,8 +9578,8 @@
         </p:nvSpPr>
         <p:spPr>
           <a:xfrm>
-            <a:off x="2679134" y="3825026"/>
-            <a:ext cx="6833731" cy="369332"/>
+            <a:off x="3117189" y="3825026"/>
+            <a:ext cx="5957623" cy="369332"/>
           </a:xfrm>
           <a:prstGeom prst="rect">
             <a:avLst/>
@@ -9455,6 +9643,18 @@
           <a:p>
             <a:pPr algn="ctr"/>
             <a:r>
+              <a:rPr lang="ru-RU" b="1" dirty="0">
+                <a:effectLst>
+                  <a:outerShdw blurRad="38100" dist="38100" dir="2700000" algn="tl">
+                    <a:srgbClr val="000000">
+                      <a:alpha val="43137"/>
+                    </a:srgbClr>
+                  </a:outerShdw>
+                </a:effectLst>
+              </a:rPr>
+              <a:t>Область распространения </a:t>
+            </a:r>
+            <a:r>
               <a:rPr lang="en-US" b="1" dirty="0">
                 <a:effectLst>
                   <a:outerShdw blurRad="38100" dist="38100" dir="2700000" algn="tl">
@@ -9464,7 +9664,7 @@
                   </a:outerShdw>
                 </a:effectLst>
               </a:rPr>
-              <a:t>Caution: </a:t>
+              <a:t>ABCNET </a:t>
             </a:r>
             <a:r>
               <a:rPr lang="ru-RU" b="1" dirty="0">
@@ -9476,7 +9676,19 @@
                   </a:outerShdw>
                 </a:effectLst>
               </a:rPr>
-              <a:t>Область распространения </a:t>
+              <a:t>шире, чем </a:t>
+            </a:r>
+            <a:r>
+              <a:rPr lang="en-US" b="1" dirty="0" err="1">
+                <a:effectLst>
+                  <a:outerShdw blurRad="38100" dist="38100" dir="2700000" algn="tl">
+                    <a:srgbClr val="000000">
+                      <a:alpha val="43137"/>
+                    </a:srgbClr>
+                  </a:outerShdw>
+                </a:effectLst>
+              </a:rPr>
+              <a:t>PABCSystem</a:t>
             </a:r>
             <a:r>
               <a:rPr lang="en-US" b="1" dirty="0">
@@ -9488,43 +9700,54 @@
                   </a:outerShdw>
                 </a:effectLst>
               </a:rPr>
-              <a:t>ABCNET </a:t>
-            </a:r>
-            <a:r>
-              <a:rPr lang="ru-RU" b="1" dirty="0">
-                <a:effectLst>
-                  <a:outerShdw blurRad="38100" dist="38100" dir="2700000" algn="tl">
-                    <a:srgbClr val="000000">
-                      <a:alpha val="43137"/>
-                    </a:srgbClr>
-                  </a:outerShdw>
-                </a:effectLst>
-              </a:rPr>
-              <a:t>шире, чем </a:t>
-            </a:r>
-            <a:r>
-              <a:rPr lang="en-US" b="1" dirty="0" err="1">
-                <a:effectLst>
-                  <a:outerShdw blurRad="38100" dist="38100" dir="2700000" algn="tl">
-                    <a:srgbClr val="000000">
-                      <a:alpha val="43137"/>
-                    </a:srgbClr>
-                  </a:outerShdw>
-                </a:effectLst>
-              </a:rPr>
-              <a:t>PABCSystem</a:t>
-            </a:r>
-            <a:r>
-              <a:rPr lang="en-US" b="1" dirty="0">
-                <a:effectLst>
-                  <a:outerShdw blurRad="38100" dist="38100" dir="2700000" algn="tl">
-                    <a:srgbClr val="000000">
-                      <a:alpha val="43137"/>
-                    </a:srgbClr>
-                  </a:outerShdw>
-                </a:effectLst>
-              </a:rPr>
               <a:t>.</a:t>
+            </a:r>
+          </a:p>
+        </p:txBody>
+      </p:sp>
+      <p:sp>
+        <p:nvSpPr>
+          <p:cNvPr id="7" name="TextBox 6">
+            <a:extLst>
+              <a:ext uri="{FF2B5EF4-FFF2-40B4-BE49-F238E27FC236}">
+                <a16:creationId xmlns:a16="http://schemas.microsoft.com/office/drawing/2014/main" id="{DDB1CD19-3FFE-4E3A-AA98-B3C0E252D99A}"/>
+              </a:ext>
+            </a:extLst>
+          </p:cNvPr>
+          <p:cNvSpPr txBox="1"/>
+          <p:nvPr/>
+        </p:nvSpPr>
+        <p:spPr>
+          <a:xfrm>
+            <a:off x="0" y="6434138"/>
+            <a:ext cx="2292824" cy="369332"/>
+          </a:xfrm>
+          <a:prstGeom prst="rect">
+            <a:avLst/>
+          </a:prstGeom>
+          <a:noFill/>
+        </p:spPr>
+        <p:txBody>
+          <a:bodyPr wrap="square" rtlCol="0">
+            <a:spAutoFit/>
+          </a:bodyPr>
+          <a:lstStyle/>
+          <a:p>
+            <a:r>
+              <a:rPr lang="en-US" dirty="0" err="1">
+                <a:solidFill>
+                  <a:srgbClr val="99CCFF"/>
+                </a:solidFill>
+              </a:rPr>
+              <a:t>NETMouse</a:t>
+            </a:r>
+            <a:r>
+              <a:rPr lang="en-US" dirty="0">
+                <a:solidFill>
+                  <a:srgbClr val="99CCFF"/>
+                </a:solidFill>
+              </a:rPr>
+              <a:t> projects ©</a:t>
             </a:r>
           </a:p>
         </p:txBody>
@@ -9539,13 +9762,13 @@
   <p:clrMapOvr>
     <a:masterClrMapping/>
   </p:clrMapOvr>
-  <mc:AlternateContent xmlns:mc="http://schemas.openxmlformats.org/markup-compatibility/2006" xmlns:p14="http://schemas.microsoft.com/office/powerpoint/2010/main">
-    <mc:Choice Requires="p14">
+  <mc:AlternateContent xmlns:mc="http://schemas.openxmlformats.org/markup-compatibility/2006">
+    <mc:Choice xmlns:p14="http://schemas.microsoft.com/office/powerpoint/2010/main" Requires="p14">
       <p:transition spd="med" p14:dur="700">
         <p:fade/>
       </p:transition>
     </mc:Choice>
-    <mc:Fallback xmlns="">
+    <mc:Fallback>
       <p:transition spd="med">
         <p:fade/>
       </p:transition>
@@ -9838,6 +10061,41 @@
                             </p:childTnLst>
                           </p:cTn>
                         </p:par>
+                        <p:par>
+                          <p:cTn id="22" fill="hold">
+                            <p:stCondLst>
+                              <p:cond delay="600"/>
+                            </p:stCondLst>
+                            <p:childTnLst>
+                              <p:par>
+                                <p:cTn id="23" presetID="26" presetClass="emph" presetSubtype="0" fill="hold" grpId="1" nodeType="afterEffect">
+                                  <p:stCondLst>
+                                    <p:cond delay="0"/>
+                                  </p:stCondLst>
+                                  <p:childTnLst>
+                                    <p:animEffect transition="out" filter="fade">
+                                      <p:cBhvr>
+                                        <p:cTn id="24" dur="500" tmFilter="0, 0; .2, .5; .8, .5; 1, 0"/>
+                                        <p:tgtEl>
+                                          <p:spTgt spid="12"/>
+                                        </p:tgtEl>
+                                      </p:cBhvr>
+                                    </p:animEffect>
+                                    <p:animScale>
+                                      <p:cBhvr>
+                                        <p:cTn id="25" dur="250" autoRev="1" fill="hold"/>
+                                        <p:tgtEl>
+                                          <p:spTgt spid="12"/>
+                                        </p:tgtEl>
+                                      </p:cBhvr>
+                                      <p:by x="105000" y="105000"/>
+                                    </p:animScale>
+                                  </p:childTnLst>
+                                </p:cTn>
+                              </p:par>
+                            </p:childTnLst>
+                          </p:cTn>
+                        </p:par>
                       </p:childTnLst>
                     </p:cTn>
                   </p:par>
@@ -9866,6 +10124,7 @@
       <p:bldP spid="10" grpId="0" animBg="1"/>
       <p:bldP spid="11" grpId="0" animBg="1"/>
       <p:bldP spid="12" grpId="0" animBg="1"/>
+      <p:bldP spid="12" grpId="1" animBg="1"/>
     </p:bldLst>
   </p:timing>
 </p:sld>
@@ -9975,12 +10234,12 @@
         <p:spPr>
           <a:xfrm>
             <a:off x="685801" y="2142067"/>
-            <a:ext cx="10131425" cy="2925770"/>
+            <a:ext cx="10131425" cy="3521754"/>
           </a:xfrm>
         </p:spPr>
         <p:txBody>
           <a:bodyPr>
-            <a:normAutofit lnSpcReduction="10000"/>
+            <a:normAutofit/>
           </a:bodyPr>
           <a:lstStyle/>
           <a:p>
@@ -9988,6 +10247,18 @@
               <a:buNone/>
             </a:pPr>
             <a:r>
+              <a:rPr lang="ru-RU" dirty="0">
+                <a:effectLst>
+                  <a:outerShdw blurRad="38100" dist="38100" dir="2700000" algn="tl">
+                    <a:srgbClr val="000000">
+                      <a:alpha val="43137"/>
+                    </a:srgbClr>
+                  </a:outerShdw>
+                </a:effectLst>
+              </a:rPr>
+              <a:t>Поскольку </a:t>
+            </a:r>
+            <a:r>
               <a:rPr lang="en-US" b="1" dirty="0" err="1">
                 <a:effectLst>
                   <a:outerShdw blurRad="38100" dist="38100" dir="2700000" algn="tl">
@@ -10000,6 +10271,18 @@
               <a:t>PABCSystem</a:t>
             </a:r>
             <a:r>
+              <a:rPr lang="en-US" dirty="0">
+                <a:effectLst>
+                  <a:outerShdw blurRad="38100" dist="38100" dir="2700000" algn="tl">
+                    <a:srgbClr val="000000">
+                      <a:alpha val="43137"/>
+                    </a:srgbClr>
+                  </a:outerShdw>
+                </a:effectLst>
+              </a:rPr>
+              <a:t> </a:t>
+            </a:r>
+            <a:r>
               <a:rPr lang="ru-RU" dirty="0">
                 <a:effectLst>
                   <a:outerShdw blurRad="38100" dist="38100" dir="2700000" algn="tl">
@@ -10009,7 +10292,79 @@
                   </a:outerShdw>
                 </a:effectLst>
               </a:rPr>
-              <a:t> разрабатывался как простой инструмент для работы с базовыми функциями </a:t>
+              <a:t>создавался, в частности, для обучения, то одна из его целей – быть максимально простым в использовании. Весь функционал распределён </a:t>
+            </a:r>
+            <a:r>
+              <a:rPr lang="en-US" dirty="0">
+                <a:effectLst>
+                  <a:outerShdw blurRad="38100" dist="38100" dir="2700000" algn="tl">
+                    <a:srgbClr val="000000">
+                      <a:alpha val="43137"/>
+                    </a:srgbClr>
+                  </a:outerShdw>
+                </a:effectLst>
+              </a:rPr>
+              <a:t>“</a:t>
+            </a:r>
+            <a:r>
+              <a:rPr lang="ru-RU" dirty="0">
+                <a:effectLst>
+                  <a:outerShdw blurRad="38100" dist="38100" dir="2700000" algn="tl">
+                    <a:srgbClr val="000000">
+                      <a:alpha val="43137"/>
+                    </a:srgbClr>
+                  </a:outerShdw>
+                </a:effectLst>
+              </a:rPr>
+              <a:t>линейно</a:t>
+            </a:r>
+            <a:r>
+              <a:rPr lang="en-US" dirty="0">
+                <a:effectLst>
+                  <a:outerShdw blurRad="38100" dist="38100" dir="2700000" algn="tl">
+                    <a:srgbClr val="000000">
+                      <a:alpha val="43137"/>
+                    </a:srgbClr>
+                  </a:outerShdw>
+                </a:effectLst>
+              </a:rPr>
+              <a:t>”</a:t>
+            </a:r>
+            <a:r>
+              <a:rPr lang="ru-RU" dirty="0">
+                <a:effectLst>
+                  <a:outerShdw blurRad="38100" dist="38100" dir="2700000" algn="tl">
+                    <a:srgbClr val="000000">
+                      <a:alpha val="43137"/>
+                    </a:srgbClr>
+                  </a:outerShdw>
+                </a:effectLst>
+              </a:rPr>
+              <a:t> по всему модулю, чтобы обучающимся было проще и быстрее его применять. Кроме пользовательских подпрограмм присутствуют </a:t>
+            </a:r>
+            <a:r>
+              <a:rPr lang="en-US" dirty="0">
+                <a:effectLst>
+                  <a:outerShdw blurRad="38100" dist="38100" dir="2700000" algn="tl">
+                    <a:srgbClr val="000000">
+                      <a:alpha val="43137"/>
+                    </a:srgbClr>
+                  </a:outerShdw>
+                </a:effectLst>
+              </a:rPr>
+              <a:t>alias-</a:t>
+            </a:r>
+            <a:r>
+              <a:rPr lang="ru-RU" dirty="0">
+                <a:effectLst>
+                  <a:outerShdw blurRad="38100" dist="38100" dir="2700000" algn="tl">
+                    <a:srgbClr val="000000">
+                      <a:alpha val="43137"/>
+                    </a:srgbClr>
+                  </a:outerShdw>
+                </a:effectLst>
+              </a:rPr>
+              <a:t>ы типов </a:t>
             </a:r>
             <a:r>
               <a:rPr lang="en-US" b="1" dirty="0">
@@ -10033,7 +10388,7 @@
                   </a:outerShdw>
                 </a:effectLst>
               </a:rPr>
-              <a:t> (</a:t>
+              <a:t> </a:t>
             </a:r>
             <a:r>
               <a:rPr lang="ru-RU" dirty="0">
@@ -10045,7 +10400,7 @@
                   </a:outerShdw>
                 </a:effectLst>
               </a:rPr>
-              <a:t>ввод-вывод, некоторые математические операции из класса </a:t>
+              <a:t>для того, чтобы избавить учащихся подключать явно нужные пространства имён. С одной стороны – это упрощение процесса написания кода, с другой – это затормаживает развитие пользователей </a:t>
             </a:r>
             <a:r>
               <a:rPr lang="en-US" b="1" dirty="0">
@@ -10057,7 +10412,31 @@
                   </a:outerShdw>
                 </a:effectLst>
               </a:rPr>
-              <a:t>Math</a:t>
+              <a:t>PascalABC.NET </a:t>
+            </a:r>
+            <a:r>
+              <a:rPr lang="ru-RU" dirty="0">
+                <a:effectLst>
+                  <a:outerShdw blurRad="38100" dist="38100" dir="2700000" algn="tl">
+                    <a:srgbClr val="000000">
+                      <a:alpha val="43137"/>
+                    </a:srgbClr>
+                  </a:outerShdw>
+                </a:effectLst>
+              </a:rPr>
+              <a:t>в </a:t>
+            </a:r>
+            <a:r>
+              <a:rPr lang="en-US" b="1" dirty="0">
+                <a:effectLst>
+                  <a:outerShdw blurRad="38100" dist="38100" dir="2700000" algn="tl">
+                    <a:srgbClr val="000000">
+                      <a:alpha val="43137"/>
+                    </a:srgbClr>
+                  </a:outerShdw>
+                </a:effectLst>
+              </a:rPr>
+              <a:t>NET</a:t>
             </a:r>
             <a:r>
               <a:rPr lang="en-US" dirty="0">
@@ -10069,25 +10448,32 @@
                   </a:outerShdw>
                 </a:effectLst>
               </a:rPr>
-              <a:t>)</a:t>
-            </a:r>
-            <a:r>
-              <a:rPr lang="ru-RU" dirty="0">
-                <a:effectLst>
-                  <a:outerShdw blurRad="38100" dist="38100" dir="2700000" algn="tl">
-                    <a:srgbClr val="000000">
-                      <a:alpha val="43137"/>
-                    </a:srgbClr>
-                  </a:outerShdw>
-                </a:effectLst>
-              </a:rPr>
-              <a:t> и дополняющий их. В итоге для простоты использования новичками многий функционал был реализован через глобальные подпрограммы. Это – быстрый доступ, но также и вред хорошей структурированности. Взамен, преподавателям, например, не надо объяснять пространства имён и классы начинающим.</a:t>
-            </a:r>
-          </a:p>
-          <a:p>
-            <a:pPr marL="0" indent="0">
-              <a:buNone/>
-            </a:pPr>
+              <a:t> </a:t>
+            </a:r>
+            <a:r>
+              <a:rPr lang="en-US" b="1" dirty="0">
+                <a:effectLst>
+                  <a:outerShdw blurRad="38100" dist="38100" dir="2700000" algn="tl">
+                    <a:srgbClr val="000000">
+                      <a:alpha val="43137"/>
+                    </a:srgbClr>
+                  </a:outerShdw>
+                </a:effectLst>
+              </a:rPr>
+              <a:t>Framework</a:t>
+            </a:r>
+            <a:r>
+              <a:rPr lang="en-US" dirty="0">
+                <a:effectLst>
+                  <a:outerShdw blurRad="38100" dist="38100" dir="2700000" algn="tl">
+                    <a:srgbClr val="000000">
+                      <a:alpha val="43137"/>
+                    </a:srgbClr>
+                  </a:outerShdw>
+                </a:effectLst>
+              </a:rPr>
+              <a:t>.</a:t>
+            </a:r>
             <a:endParaRPr lang="ru-RU" dirty="0">
               <a:effectLst>
                 <a:outerShdw blurRad="38100" dist="38100" dir="2700000" algn="tl">
@@ -10220,7 +10606,91 @@
                   </a:outerShdw>
                 </a:effectLst>
               </a:rPr>
-              <a:t> возможности библиотеки, не перегружая его. Нужный функционал легче найти, не запутываясь среди большого числа методов.</a:t>
+              <a:t> возможности библиотеки, не перегружая его. Нужный функционал легче найти, не запутываясь среди большого числа методов. Нет </a:t>
+            </a:r>
+            <a:r>
+              <a:rPr lang="en-US" dirty="0">
+                <a:effectLst>
+                  <a:outerShdw blurRad="38100" dist="38100" dir="2700000" algn="tl">
+                    <a:srgbClr val="000000">
+                      <a:alpha val="43137"/>
+                    </a:srgbClr>
+                  </a:outerShdw>
+                </a:effectLst>
+              </a:rPr>
+              <a:t>“</a:t>
+            </a:r>
+            <a:r>
+              <a:rPr lang="ru-RU" dirty="0">
+                <a:effectLst>
+                  <a:outerShdw blurRad="38100" dist="38100" dir="2700000" algn="tl">
+                    <a:srgbClr val="000000">
+                      <a:alpha val="43137"/>
+                    </a:srgbClr>
+                  </a:outerShdw>
+                </a:effectLst>
+              </a:rPr>
+              <a:t>типов-псевдонимов</a:t>
+            </a:r>
+            <a:r>
+              <a:rPr lang="en-US" dirty="0">
+                <a:effectLst>
+                  <a:outerShdw blurRad="38100" dist="38100" dir="2700000" algn="tl">
+                    <a:srgbClr val="000000">
+                      <a:alpha val="43137"/>
+                    </a:srgbClr>
+                  </a:outerShdw>
+                </a:effectLst>
+              </a:rPr>
+              <a:t>”, </a:t>
+            </a:r>
+            <a:r>
+              <a:rPr lang="ru-RU" dirty="0">
+                <a:effectLst>
+                  <a:outerShdw blurRad="38100" dist="38100" dir="2700000" algn="tl">
+                    <a:srgbClr val="000000">
+                      <a:alpha val="43137"/>
+                    </a:srgbClr>
+                  </a:outerShdw>
+                </a:effectLst>
+              </a:rPr>
+              <a:t>что позволяет писать код более понятный </a:t>
+            </a:r>
+            <a:r>
+              <a:rPr lang="en-US" b="1" dirty="0">
+                <a:effectLst>
+                  <a:outerShdw blurRad="38100" dist="38100" dir="2700000" algn="tl">
+                    <a:srgbClr val="000000">
+                      <a:alpha val="43137"/>
+                    </a:srgbClr>
+                  </a:outerShdw>
+                </a:effectLst>
+              </a:rPr>
+              <a:t>NET</a:t>
+            </a:r>
+            <a:r>
+              <a:rPr lang="en-US" dirty="0">
+                <a:effectLst>
+                  <a:outerShdw blurRad="38100" dist="38100" dir="2700000" algn="tl">
+                    <a:srgbClr val="000000">
+                      <a:alpha val="43137"/>
+                    </a:srgbClr>
+                  </a:outerShdw>
+                </a:effectLst>
+              </a:rPr>
+              <a:t> </a:t>
+            </a:r>
+            <a:r>
+              <a:rPr lang="ru-RU" dirty="0">
+                <a:effectLst>
+                  <a:outerShdw blurRad="38100" dist="38100" dir="2700000" algn="tl">
+                    <a:srgbClr val="000000">
+                      <a:alpha val="43137"/>
+                    </a:srgbClr>
+                  </a:outerShdw>
+                </a:effectLst>
+              </a:rPr>
+              <a:t>разработчикам.</a:t>
             </a:r>
           </a:p>
         </p:txBody>
@@ -10435,8 +10905,8 @@
         </p:nvSpPr>
         <p:spPr>
           <a:xfrm>
-            <a:off x="2771105" y="5296146"/>
-            <a:ext cx="6649791" cy="369332"/>
+            <a:off x="3248472" y="5699892"/>
+            <a:ext cx="5695057" cy="369332"/>
           </a:xfrm>
           <a:prstGeom prst="rect">
             <a:avLst/>
@@ -10500,6 +10970,18 @@
           <a:p>
             <a:pPr algn="ctr"/>
             <a:r>
+              <a:rPr lang="ru-RU" b="1" dirty="0">
+                <a:effectLst>
+                  <a:outerShdw blurRad="38100" dist="38100" dir="2700000" algn="tl">
+                    <a:srgbClr val="000000">
+                      <a:alpha val="43137"/>
+                    </a:srgbClr>
+                  </a:outerShdw>
+                </a:effectLst>
+              </a:rPr>
+              <a:t>Структурированность </a:t>
+            </a:r>
+            <a:r>
               <a:rPr lang="en-US" b="1" dirty="0">
                 <a:effectLst>
                   <a:outerShdw blurRad="38100" dist="38100" dir="2700000" algn="tl">
@@ -10509,7 +10991,7 @@
                   </a:outerShdw>
                 </a:effectLst>
               </a:rPr>
-              <a:t>Caution: </a:t>
+              <a:t>ABCNET </a:t>
             </a:r>
             <a:r>
               <a:rPr lang="ru-RU" b="1" dirty="0">
@@ -10521,7 +11003,19 @@
                   </a:outerShdw>
                 </a:effectLst>
               </a:rPr>
-              <a:t>Структурированность </a:t>
+              <a:t>выше, чем у </a:t>
+            </a:r>
+            <a:r>
+              <a:rPr lang="en-US" b="1" dirty="0" err="1">
+                <a:effectLst>
+                  <a:outerShdw blurRad="38100" dist="38100" dir="2700000" algn="tl">
+                    <a:srgbClr val="000000">
+                      <a:alpha val="43137"/>
+                    </a:srgbClr>
+                  </a:outerShdw>
+                </a:effectLst>
+              </a:rPr>
+              <a:t>PABCSystem</a:t>
             </a:r>
             <a:r>
               <a:rPr lang="en-US" b="1" dirty="0">
@@ -10533,43 +11027,54 @@
                   </a:outerShdw>
                 </a:effectLst>
               </a:rPr>
-              <a:t>ABCNET </a:t>
-            </a:r>
-            <a:r>
-              <a:rPr lang="ru-RU" b="1" dirty="0">
-                <a:effectLst>
-                  <a:outerShdw blurRad="38100" dist="38100" dir="2700000" algn="tl">
-                    <a:srgbClr val="000000">
-                      <a:alpha val="43137"/>
-                    </a:srgbClr>
-                  </a:outerShdw>
-                </a:effectLst>
-              </a:rPr>
-              <a:t>выше, чем у </a:t>
-            </a:r>
-            <a:r>
-              <a:rPr lang="en-US" b="1" dirty="0" err="1">
-                <a:effectLst>
-                  <a:outerShdw blurRad="38100" dist="38100" dir="2700000" algn="tl">
-                    <a:srgbClr val="000000">
-                      <a:alpha val="43137"/>
-                    </a:srgbClr>
-                  </a:outerShdw>
-                </a:effectLst>
-              </a:rPr>
-              <a:t>PABCSystem</a:t>
-            </a:r>
-            <a:r>
-              <a:rPr lang="en-US" b="1" dirty="0">
-                <a:effectLst>
-                  <a:outerShdw blurRad="38100" dist="38100" dir="2700000" algn="tl">
-                    <a:srgbClr val="000000">
-                      <a:alpha val="43137"/>
-                    </a:srgbClr>
-                  </a:outerShdw>
-                </a:effectLst>
-              </a:rPr>
               <a:t>.</a:t>
+            </a:r>
+          </a:p>
+        </p:txBody>
+      </p:sp>
+      <p:sp>
+        <p:nvSpPr>
+          <p:cNvPr id="7" name="TextBox 6">
+            <a:extLst>
+              <a:ext uri="{FF2B5EF4-FFF2-40B4-BE49-F238E27FC236}">
+                <a16:creationId xmlns:a16="http://schemas.microsoft.com/office/drawing/2014/main" id="{9951ECE8-075B-4FF5-9151-3F1B7487DC82}"/>
+              </a:ext>
+            </a:extLst>
+          </p:cNvPr>
+          <p:cNvSpPr txBox="1"/>
+          <p:nvPr/>
+        </p:nvSpPr>
+        <p:spPr>
+          <a:xfrm>
+            <a:off x="0" y="6434138"/>
+            <a:ext cx="2292824" cy="369332"/>
+          </a:xfrm>
+          <a:prstGeom prst="rect">
+            <a:avLst/>
+          </a:prstGeom>
+          <a:noFill/>
+        </p:spPr>
+        <p:txBody>
+          <a:bodyPr wrap="square" rtlCol="0">
+            <a:spAutoFit/>
+          </a:bodyPr>
+          <a:lstStyle/>
+          <a:p>
+            <a:r>
+              <a:rPr lang="en-US" dirty="0" err="1">
+                <a:solidFill>
+                  <a:srgbClr val="99CCFF"/>
+                </a:solidFill>
+              </a:rPr>
+              <a:t>NETMouse</a:t>
+            </a:r>
+            <a:r>
+              <a:rPr lang="en-US" dirty="0">
+                <a:solidFill>
+                  <a:srgbClr val="99CCFF"/>
+                </a:solidFill>
+              </a:rPr>
+              <a:t> projects ©</a:t>
             </a:r>
           </a:p>
         </p:txBody>
@@ -10883,6 +11388,41 @@
                             </p:childTnLst>
                           </p:cTn>
                         </p:par>
+                        <p:par>
+                          <p:cTn id="22" fill="hold">
+                            <p:stCondLst>
+                              <p:cond delay="600"/>
+                            </p:stCondLst>
+                            <p:childTnLst>
+                              <p:par>
+                                <p:cTn id="23" presetID="26" presetClass="emph" presetSubtype="0" fill="hold" grpId="1" nodeType="afterEffect">
+                                  <p:stCondLst>
+                                    <p:cond delay="0"/>
+                                  </p:stCondLst>
+                                  <p:childTnLst>
+                                    <p:animEffect transition="out" filter="fade">
+                                      <p:cBhvr>
+                                        <p:cTn id="24" dur="500" tmFilter="0, 0; .2, .5; .8, .5; 1, 0"/>
+                                        <p:tgtEl>
+                                          <p:spTgt spid="12"/>
+                                        </p:tgtEl>
+                                      </p:cBhvr>
+                                    </p:animEffect>
+                                    <p:animScale>
+                                      <p:cBhvr>
+                                        <p:cTn id="25" dur="250" autoRev="1" fill="hold"/>
+                                        <p:tgtEl>
+                                          <p:spTgt spid="12"/>
+                                        </p:tgtEl>
+                                      </p:cBhvr>
+                                      <p:by x="105000" y="105000"/>
+                                    </p:animScale>
+                                  </p:childTnLst>
+                                </p:cTn>
+                              </p:par>
+                            </p:childTnLst>
+                          </p:cTn>
+                        </p:par>
                       </p:childTnLst>
                     </p:cTn>
                   </p:par>
@@ -10911,6 +11451,7 @@
       <p:bldP spid="10" grpId="0" animBg="1"/>
       <p:bldP spid="11" grpId="0" animBg="1"/>
       <p:bldP spid="12" grpId="0" animBg="1"/>
+      <p:bldP spid="12" grpId="1" animBg="1"/>
     </p:bldLst>
   </p:timing>
 </p:sld>
@@ -11081,33 +11622,8 @@
             </a:r>
             <a:r>
               <a:rPr lang="ru-RU" dirty="0"/>
-              <a:t>идёт по-иному – его функционал добавляется порциями, чтобы соблюдать единообразие библиотеки. Как результат – запомнить что и где и как использовать легче, ибо количество </a:t>
-            </a:r>
-            <a:r>
-              <a:rPr lang="en-US" dirty="0"/>
-              <a:t>“</a:t>
-            </a:r>
-            <a:r>
-              <a:rPr lang="ru-RU" dirty="0"/>
-              <a:t>исключений из правил</a:t>
-            </a:r>
-            <a:r>
-              <a:rPr lang="en-US" dirty="0"/>
-              <a:t>” </a:t>
-            </a:r>
-            <a:r>
-              <a:rPr lang="ru-RU" dirty="0"/>
-              <a:t>с меньше, чем в </a:t>
-            </a:r>
-            <a:r>
-              <a:rPr lang="en-US" b="1" dirty="0" err="1"/>
-              <a:t>PABCSystem</a:t>
-            </a:r>
-            <a:r>
-              <a:rPr lang="en-US" dirty="0"/>
-              <a:t>.</a:t>
-            </a:r>
-            <a:endParaRPr lang="ru-RU" dirty="0"/>
+              <a:t>идёт по-иному – его функционал добавляется порциями, чтобы соблюдать единообразие библиотеки. Как результат – запомнить что и где и как использовать легче.</a:t>
+            </a:r>
           </a:p>
         </p:txBody>
       </p:sp>
@@ -11321,8 +11837,8 @@
         </p:nvSpPr>
         <p:spPr>
           <a:xfrm>
-            <a:off x="2797936" y="5296146"/>
-            <a:ext cx="6596129" cy="369332"/>
+            <a:off x="3298282" y="5067837"/>
+            <a:ext cx="5595437" cy="369332"/>
           </a:xfrm>
           <a:prstGeom prst="rect">
             <a:avLst/>
@@ -11386,6 +11902,18 @@
           <a:p>
             <a:pPr algn="ctr"/>
             <a:r>
+              <a:rPr lang="ru-RU" b="1" dirty="0">
+                <a:effectLst>
+                  <a:outerShdw blurRad="38100" dist="38100" dir="2700000" algn="tl">
+                    <a:srgbClr val="000000">
+                      <a:alpha val="43137"/>
+                    </a:srgbClr>
+                  </a:outerShdw>
+                </a:effectLst>
+              </a:rPr>
+              <a:t>Код </a:t>
+            </a:r>
+            <a:r>
               <a:rPr lang="en-US" b="1" dirty="0">
                 <a:effectLst>
                   <a:outerShdw blurRad="38100" dist="38100" dir="2700000" algn="tl">
@@ -11395,7 +11923,7 @@
                   </a:outerShdw>
                 </a:effectLst>
               </a:rPr>
-              <a:t>Caution: </a:t>
+              <a:t>ABCNET </a:t>
             </a:r>
             <a:r>
               <a:rPr lang="ru-RU" b="1" dirty="0">
@@ -11407,7 +11935,43 @@
                   </a:outerShdw>
                 </a:effectLst>
               </a:rPr>
-              <a:t>Код </a:t>
+              <a:t>лучше </a:t>
+            </a:r>
+            <a:r>
+              <a:rPr lang="ru-RU" b="1" dirty="0" err="1">
+                <a:effectLst>
+                  <a:outerShdw blurRad="38100" dist="38100" dir="2700000" algn="tl">
+                    <a:srgbClr val="000000">
+                      <a:alpha val="43137"/>
+                    </a:srgbClr>
+                  </a:outerShdw>
+                </a:effectLst>
+              </a:rPr>
+              <a:t>структурироован</a:t>
+            </a:r>
+            <a:r>
+              <a:rPr lang="ru-RU" b="1" dirty="0">
+                <a:effectLst>
+                  <a:outerShdw blurRad="38100" dist="38100" dir="2700000" algn="tl">
+                    <a:srgbClr val="000000">
+                      <a:alpha val="43137"/>
+                    </a:srgbClr>
+                  </a:outerShdw>
+                </a:effectLst>
+              </a:rPr>
+              <a:t>, чем </a:t>
+            </a:r>
+            <a:r>
+              <a:rPr lang="en-US" b="1" dirty="0" err="1">
+                <a:effectLst>
+                  <a:outerShdw blurRad="38100" dist="38100" dir="2700000" algn="tl">
+                    <a:srgbClr val="000000">
+                      <a:alpha val="43137"/>
+                    </a:srgbClr>
+                  </a:outerShdw>
+                </a:effectLst>
+              </a:rPr>
+              <a:t>PABCSystem</a:t>
             </a:r>
             <a:r>
               <a:rPr lang="en-US" b="1" dirty="0">
@@ -11419,67 +11983,54 @@
                   </a:outerShdw>
                 </a:effectLst>
               </a:rPr>
-              <a:t>ABCNET </a:t>
-            </a:r>
-            <a:r>
-              <a:rPr lang="ru-RU" b="1" dirty="0">
-                <a:effectLst>
-                  <a:outerShdw blurRad="38100" dist="38100" dir="2700000" algn="tl">
-                    <a:srgbClr val="000000">
-                      <a:alpha val="43137"/>
-                    </a:srgbClr>
-                  </a:outerShdw>
-                </a:effectLst>
-              </a:rPr>
-              <a:t>лучше </a:t>
-            </a:r>
-            <a:r>
-              <a:rPr lang="ru-RU" b="1" dirty="0" err="1">
-                <a:effectLst>
-                  <a:outerShdw blurRad="38100" dist="38100" dir="2700000" algn="tl">
-                    <a:srgbClr val="000000">
-                      <a:alpha val="43137"/>
-                    </a:srgbClr>
-                  </a:outerShdw>
-                </a:effectLst>
-              </a:rPr>
-              <a:t>структурироован</a:t>
-            </a:r>
-            <a:r>
-              <a:rPr lang="ru-RU" b="1" dirty="0">
-                <a:effectLst>
-                  <a:outerShdw blurRad="38100" dist="38100" dir="2700000" algn="tl">
-                    <a:srgbClr val="000000">
-                      <a:alpha val="43137"/>
-                    </a:srgbClr>
-                  </a:outerShdw>
-                </a:effectLst>
-              </a:rPr>
-              <a:t>, чем </a:t>
-            </a:r>
-            <a:r>
-              <a:rPr lang="en-US" b="1" dirty="0" err="1">
-                <a:effectLst>
-                  <a:outerShdw blurRad="38100" dist="38100" dir="2700000" algn="tl">
-                    <a:srgbClr val="000000">
-                      <a:alpha val="43137"/>
-                    </a:srgbClr>
-                  </a:outerShdw>
-                </a:effectLst>
-              </a:rPr>
-              <a:t>PABCSystem</a:t>
-            </a:r>
-            <a:r>
-              <a:rPr lang="en-US" b="1" dirty="0">
-                <a:effectLst>
-                  <a:outerShdw blurRad="38100" dist="38100" dir="2700000" algn="tl">
-                    <a:srgbClr val="000000">
-                      <a:alpha val="43137"/>
-                    </a:srgbClr>
-                  </a:outerShdw>
-                </a:effectLst>
-              </a:rPr>
               <a:t>.</a:t>
+            </a:r>
+          </a:p>
+        </p:txBody>
+      </p:sp>
+      <p:sp>
+        <p:nvSpPr>
+          <p:cNvPr id="7" name="TextBox 6">
+            <a:extLst>
+              <a:ext uri="{FF2B5EF4-FFF2-40B4-BE49-F238E27FC236}">
+                <a16:creationId xmlns:a16="http://schemas.microsoft.com/office/drawing/2014/main" id="{834F4D7D-C14B-43C7-9F87-FF826F9B868E}"/>
+              </a:ext>
+            </a:extLst>
+          </p:cNvPr>
+          <p:cNvSpPr txBox="1"/>
+          <p:nvPr/>
+        </p:nvSpPr>
+        <p:spPr>
+          <a:xfrm>
+            <a:off x="0" y="6434138"/>
+            <a:ext cx="2292824" cy="369332"/>
+          </a:xfrm>
+          <a:prstGeom prst="rect">
+            <a:avLst/>
+          </a:prstGeom>
+          <a:noFill/>
+        </p:spPr>
+        <p:txBody>
+          <a:bodyPr wrap="square" rtlCol="0">
+            <a:spAutoFit/>
+          </a:bodyPr>
+          <a:lstStyle/>
+          <a:p>
+            <a:r>
+              <a:rPr lang="en-US" dirty="0" err="1">
+                <a:solidFill>
+                  <a:srgbClr val="99CCFF"/>
+                </a:solidFill>
+              </a:rPr>
+              <a:t>NETMouse</a:t>
+            </a:r>
+            <a:r>
+              <a:rPr lang="en-US" dirty="0">
+                <a:solidFill>
+                  <a:srgbClr val="99CCFF"/>
+                </a:solidFill>
+              </a:rPr>
+              <a:t> projects ©</a:t>
             </a:r>
           </a:p>
         </p:txBody>
@@ -11793,6 +12344,41 @@
                             </p:childTnLst>
                           </p:cTn>
                         </p:par>
+                        <p:par>
+                          <p:cTn id="22" fill="hold">
+                            <p:stCondLst>
+                              <p:cond delay="600"/>
+                            </p:stCondLst>
+                            <p:childTnLst>
+                              <p:par>
+                                <p:cTn id="23" presetID="26" presetClass="emph" presetSubtype="0" fill="hold" grpId="1" nodeType="afterEffect">
+                                  <p:stCondLst>
+                                    <p:cond delay="0"/>
+                                  </p:stCondLst>
+                                  <p:childTnLst>
+                                    <p:animEffect transition="out" filter="fade">
+                                      <p:cBhvr>
+                                        <p:cTn id="24" dur="500" tmFilter="0, 0; .2, .5; .8, .5; 1, 0"/>
+                                        <p:tgtEl>
+                                          <p:spTgt spid="12"/>
+                                        </p:tgtEl>
+                                      </p:cBhvr>
+                                    </p:animEffect>
+                                    <p:animScale>
+                                      <p:cBhvr>
+                                        <p:cTn id="25" dur="250" autoRev="1" fill="hold"/>
+                                        <p:tgtEl>
+                                          <p:spTgt spid="12"/>
+                                        </p:tgtEl>
+                                      </p:cBhvr>
+                                      <p:by x="105000" y="105000"/>
+                                    </p:animScale>
+                                  </p:childTnLst>
+                                </p:cTn>
+                              </p:par>
+                            </p:childTnLst>
+                          </p:cTn>
+                        </p:par>
                       </p:childTnLst>
                     </p:cTn>
                   </p:par>
@@ -11821,6 +12407,7 @@
       <p:bldP spid="10" grpId="0" animBg="1"/>
       <p:bldP spid="11" grpId="0" animBg="1"/>
       <p:bldP spid="12" grpId="0" animBg="1"/>
+      <p:bldP spid="12" grpId="1" animBg="1"/>
     </p:bldLst>
   </p:timing>
 </p:sld>
@@ -11930,12 +12517,12 @@
         <p:spPr>
           <a:xfrm>
             <a:off x="685801" y="2142067"/>
-            <a:ext cx="10131425" cy="2784102"/>
+            <a:ext cx="10131425" cy="2650068"/>
           </a:xfrm>
         </p:spPr>
         <p:txBody>
           <a:bodyPr>
-            <a:normAutofit lnSpcReduction="10000"/>
+            <a:normAutofit/>
           </a:bodyPr>
           <a:lstStyle/>
           <a:p>
@@ -12000,7 +12587,7 @@
                   </a:outerShdw>
                 </a:effectLst>
               </a:rPr>
-              <a:t>будет тянуться лишняя и ненужная пользователю </a:t>
+              <a:t>будет тянуться лишняя и ненужная </a:t>
             </a:r>
             <a:r>
               <a:rPr lang="en-US" dirty="0">
@@ -12103,7 +12690,55 @@
                   </a:outerShdw>
                 </a:effectLst>
               </a:rPr>
-              <a:t>. Поскольку он не зависит от конкретного компилятора (как и в обратную сторону), то у него нет лишнего для пользователя кода. В библиотеке содержаться исключительные пользовательские операции.</a:t>
+              <a:t>. Он не зависит от конкретного языка (как и в обратную сторону), как следствие у него нет </a:t>
+            </a:r>
+            <a:r>
+              <a:rPr lang="en-US" dirty="0">
+                <a:effectLst>
+                  <a:outerShdw blurRad="38100" dist="38100" dir="2700000" algn="tl">
+                    <a:srgbClr val="000000">
+                      <a:alpha val="43137"/>
+                    </a:srgbClr>
+                  </a:outerShdw>
+                </a:effectLst>
+              </a:rPr>
+              <a:t>“</a:t>
+            </a:r>
+            <a:r>
+              <a:rPr lang="ru-RU" dirty="0">
+                <a:effectLst>
+                  <a:outerShdw blurRad="38100" dist="38100" dir="2700000" algn="tl">
+                    <a:srgbClr val="000000">
+                      <a:alpha val="43137"/>
+                    </a:srgbClr>
+                  </a:outerShdw>
+                </a:effectLst>
+              </a:rPr>
+              <a:t>лишнего</a:t>
+            </a:r>
+            <a:r>
+              <a:rPr lang="en-US" dirty="0">
+                <a:effectLst>
+                  <a:outerShdw blurRad="38100" dist="38100" dir="2700000" algn="tl">
+                    <a:srgbClr val="000000">
+                      <a:alpha val="43137"/>
+                    </a:srgbClr>
+                  </a:outerShdw>
+                </a:effectLst>
+              </a:rPr>
+              <a:t>”</a:t>
+            </a:r>
+            <a:r>
+              <a:rPr lang="ru-RU" dirty="0">
+                <a:effectLst>
+                  <a:outerShdw blurRad="38100" dist="38100" dir="2700000" algn="tl">
+                    <a:srgbClr val="000000">
+                      <a:alpha val="43137"/>
+                    </a:srgbClr>
+                  </a:outerShdw>
+                </a:effectLst>
+              </a:rPr>
+              <a:t> (в контексте выполнения рутинных задач) для пользователя кода.</a:t>
             </a:r>
           </a:p>
         </p:txBody>
@@ -12318,8 +12953,8 @@
         </p:nvSpPr>
         <p:spPr>
           <a:xfrm>
-            <a:off x="1346915" y="4926169"/>
-            <a:ext cx="9498169" cy="369332"/>
+            <a:off x="1781201" y="4792135"/>
+            <a:ext cx="8629598" cy="369332"/>
           </a:xfrm>
           <a:prstGeom prst="rect">
             <a:avLst/>
@@ -12383,6 +13018,18 @@
           <a:p>
             <a:pPr algn="ctr"/>
             <a:r>
+              <a:rPr lang="ru-RU" b="1" dirty="0">
+                <a:effectLst>
+                  <a:outerShdw blurRad="38100" dist="38100" dir="2700000" algn="tl">
+                    <a:srgbClr val="000000">
+                      <a:alpha val="43137"/>
+                    </a:srgbClr>
+                  </a:outerShdw>
+                </a:effectLst>
+              </a:rPr>
+              <a:t>Код </a:t>
+            </a:r>
+            <a:r>
               <a:rPr lang="en-US" b="1" dirty="0">
                 <a:effectLst>
                   <a:outerShdw blurRad="38100" dist="38100" dir="2700000" algn="tl">
@@ -12392,7 +13039,7 @@
                   </a:outerShdw>
                 </a:effectLst>
               </a:rPr>
-              <a:t>Caution: </a:t>
+              <a:t>ABCNET </a:t>
             </a:r>
             <a:r>
               <a:rPr lang="ru-RU" b="1" dirty="0">
@@ -12404,7 +13051,19 @@
                   </a:outerShdw>
                 </a:effectLst>
               </a:rPr>
-              <a:t>Код </a:t>
+              <a:t>чист от привязок к конкретному компилятору, в отличии от </a:t>
+            </a:r>
+            <a:r>
+              <a:rPr lang="en-US" b="1" dirty="0" err="1">
+                <a:effectLst>
+                  <a:outerShdw blurRad="38100" dist="38100" dir="2700000" algn="tl">
+                    <a:srgbClr val="000000">
+                      <a:alpha val="43137"/>
+                    </a:srgbClr>
+                  </a:outerShdw>
+                </a:effectLst>
+              </a:rPr>
+              <a:t>PABCSystem</a:t>
             </a:r>
             <a:r>
               <a:rPr lang="en-US" b="1" dirty="0">
@@ -12416,43 +13075,54 @@
                   </a:outerShdw>
                 </a:effectLst>
               </a:rPr>
-              <a:t>ABCNET </a:t>
-            </a:r>
-            <a:r>
-              <a:rPr lang="ru-RU" b="1" dirty="0">
-                <a:effectLst>
-                  <a:outerShdw blurRad="38100" dist="38100" dir="2700000" algn="tl">
-                    <a:srgbClr val="000000">
-                      <a:alpha val="43137"/>
-                    </a:srgbClr>
-                  </a:outerShdw>
-                </a:effectLst>
-              </a:rPr>
-              <a:t>чист от привязок к конкретному компилятору, в отличии от </a:t>
-            </a:r>
-            <a:r>
-              <a:rPr lang="en-US" b="1" dirty="0" err="1">
-                <a:effectLst>
-                  <a:outerShdw blurRad="38100" dist="38100" dir="2700000" algn="tl">
-                    <a:srgbClr val="000000">
-                      <a:alpha val="43137"/>
-                    </a:srgbClr>
-                  </a:outerShdw>
-                </a:effectLst>
-              </a:rPr>
-              <a:t>PABCSystem</a:t>
-            </a:r>
-            <a:r>
-              <a:rPr lang="en-US" b="1" dirty="0">
-                <a:effectLst>
-                  <a:outerShdw blurRad="38100" dist="38100" dir="2700000" algn="tl">
-                    <a:srgbClr val="000000">
-                      <a:alpha val="43137"/>
-                    </a:srgbClr>
-                  </a:outerShdw>
-                </a:effectLst>
-              </a:rPr>
               <a:t>.</a:t>
+            </a:r>
+          </a:p>
+        </p:txBody>
+      </p:sp>
+      <p:sp>
+        <p:nvSpPr>
+          <p:cNvPr id="7" name="TextBox 6">
+            <a:extLst>
+              <a:ext uri="{FF2B5EF4-FFF2-40B4-BE49-F238E27FC236}">
+                <a16:creationId xmlns:a16="http://schemas.microsoft.com/office/drawing/2014/main" id="{644EE6EA-0BDB-42CE-85CE-2215DC791394}"/>
+              </a:ext>
+            </a:extLst>
+          </p:cNvPr>
+          <p:cNvSpPr txBox="1"/>
+          <p:nvPr/>
+        </p:nvSpPr>
+        <p:spPr>
+          <a:xfrm>
+            <a:off x="0" y="6434138"/>
+            <a:ext cx="2292824" cy="369332"/>
+          </a:xfrm>
+          <a:prstGeom prst="rect">
+            <a:avLst/>
+          </a:prstGeom>
+          <a:noFill/>
+        </p:spPr>
+        <p:txBody>
+          <a:bodyPr wrap="square" rtlCol="0">
+            <a:spAutoFit/>
+          </a:bodyPr>
+          <a:lstStyle/>
+          <a:p>
+            <a:r>
+              <a:rPr lang="en-US" dirty="0" err="1">
+                <a:solidFill>
+                  <a:srgbClr val="99CCFF"/>
+                </a:solidFill>
+              </a:rPr>
+              <a:t>NETMouse</a:t>
+            </a:r>
+            <a:r>
+              <a:rPr lang="en-US" dirty="0">
+                <a:solidFill>
+                  <a:srgbClr val="99CCFF"/>
+                </a:solidFill>
+              </a:rPr>
+              <a:t> projects ©</a:t>
             </a:r>
           </a:p>
         </p:txBody>
@@ -12766,6 +13436,41 @@
                             </p:childTnLst>
                           </p:cTn>
                         </p:par>
+                        <p:par>
+                          <p:cTn id="22" fill="hold">
+                            <p:stCondLst>
+                              <p:cond delay="600"/>
+                            </p:stCondLst>
+                            <p:childTnLst>
+                              <p:par>
+                                <p:cTn id="23" presetID="26" presetClass="emph" presetSubtype="0" fill="hold" grpId="1" nodeType="afterEffect">
+                                  <p:stCondLst>
+                                    <p:cond delay="0"/>
+                                  </p:stCondLst>
+                                  <p:childTnLst>
+                                    <p:animEffect transition="out" filter="fade">
+                                      <p:cBhvr>
+                                        <p:cTn id="24" dur="500" tmFilter="0, 0; .2, .5; .8, .5; 1, 0"/>
+                                        <p:tgtEl>
+                                          <p:spTgt spid="12"/>
+                                        </p:tgtEl>
+                                      </p:cBhvr>
+                                    </p:animEffect>
+                                    <p:animScale>
+                                      <p:cBhvr>
+                                        <p:cTn id="25" dur="250" autoRev="1" fill="hold"/>
+                                        <p:tgtEl>
+                                          <p:spTgt spid="12"/>
+                                        </p:tgtEl>
+                                      </p:cBhvr>
+                                      <p:by x="105000" y="105000"/>
+                                    </p:animScale>
+                                  </p:childTnLst>
+                                </p:cTn>
+                              </p:par>
+                            </p:childTnLst>
+                          </p:cTn>
+                        </p:par>
                       </p:childTnLst>
                     </p:cTn>
                   </p:par>
@@ -12794,6 +13499,7 @@
       <p:bldP spid="10" grpId="0" animBg="1"/>
       <p:bldP spid="11" grpId="0" animBg="1"/>
       <p:bldP spid="12" grpId="0" animBg="1"/>
+      <p:bldP spid="12" grpId="1" animBg="1"/>
     </p:bldLst>
   </p:timing>
 </p:sld>
@@ -13153,6 +13859,53 @@
                 </a:effectLst>
               </a:rPr>
               <a:t>Next</a:t>
+            </a:r>
+          </a:p>
+        </p:txBody>
+      </p:sp>
+      <p:sp>
+        <p:nvSpPr>
+          <p:cNvPr id="6" name="TextBox 5">
+            <a:extLst>
+              <a:ext uri="{FF2B5EF4-FFF2-40B4-BE49-F238E27FC236}">
+                <a16:creationId xmlns:a16="http://schemas.microsoft.com/office/drawing/2014/main" id="{39AE9B40-6E39-4663-BA64-42EAEA7E9E61}"/>
+              </a:ext>
+            </a:extLst>
+          </p:cNvPr>
+          <p:cNvSpPr txBox="1"/>
+          <p:nvPr/>
+        </p:nvSpPr>
+        <p:spPr>
+          <a:xfrm>
+            <a:off x="0" y="6434138"/>
+            <a:ext cx="2292824" cy="369332"/>
+          </a:xfrm>
+          <a:prstGeom prst="rect">
+            <a:avLst/>
+          </a:prstGeom>
+          <a:noFill/>
+        </p:spPr>
+        <p:txBody>
+          <a:bodyPr wrap="square" rtlCol="0">
+            <a:spAutoFit/>
+          </a:bodyPr>
+          <a:lstStyle/>
+          <a:p>
+            <a:r>
+              <a:rPr lang="en-US" dirty="0" err="1">
+                <a:solidFill>
+                  <a:srgbClr val="99CCFF"/>
+                </a:solidFill>
+              </a:rPr>
+              <a:t>NETMouse</a:t>
+            </a:r>
+            <a:r>
+              <a:rPr lang="en-US" dirty="0">
+                <a:solidFill>
+                  <a:srgbClr val="99CCFF"/>
+                </a:solidFill>
+              </a:rPr>
+              <a:t> projects ©</a:t>
             </a:r>
           </a:p>
         </p:txBody>
@@ -13512,7 +14265,7 @@
         <p:spPr>
           <a:xfrm>
             <a:off x="685801" y="2142068"/>
-            <a:ext cx="10131425" cy="704163"/>
+            <a:ext cx="10131425" cy="1029897"/>
           </a:xfrm>
         </p:spPr>
         <p:txBody>
@@ -13606,7 +14359,103 @@
                   </a:outerShdw>
                 </a:effectLst>
               </a:rPr>
-              <a:t>Кроме того, он сделан в более удобной для использования форме.</a:t>
+              <a:t>Кроме того, он сделан в более удобной для использования форме. Так, например, операции вывода</a:t>
+            </a:r>
+            <a:r>
+              <a:rPr lang="en-US" dirty="0">
+                <a:effectLst>
+                  <a:outerShdw blurRad="38100" dist="38100" dir="2700000" algn="tl">
+                    <a:srgbClr val="000000">
+                      <a:alpha val="43137"/>
+                    </a:srgbClr>
+                  </a:outerShdw>
+                </a:effectLst>
+              </a:rPr>
+              <a:t> </a:t>
+            </a:r>
+            <a:r>
+              <a:rPr lang="ru-RU" dirty="0">
+                <a:effectLst>
+                  <a:outerShdw blurRad="38100" dist="38100" dir="2700000" algn="tl">
+                    <a:srgbClr val="000000">
+                      <a:alpha val="43137"/>
+                    </a:srgbClr>
+                  </a:outerShdw>
+                </a:effectLst>
+              </a:rPr>
+              <a:t>в </a:t>
+            </a:r>
+            <a:r>
+              <a:rPr lang="en-US" b="1" dirty="0">
+                <a:effectLst>
+                  <a:outerShdw blurRad="38100" dist="38100" dir="2700000" algn="tl">
+                    <a:srgbClr val="000000">
+                      <a:alpha val="43137"/>
+                    </a:srgbClr>
+                  </a:outerShdw>
+                </a:effectLst>
+              </a:rPr>
+              <a:t>ABCNET</a:t>
+            </a:r>
+            <a:r>
+              <a:rPr lang="ru-RU" dirty="0">
+                <a:effectLst>
+                  <a:outerShdw blurRad="38100" dist="38100" dir="2700000" algn="tl">
+                    <a:srgbClr val="000000">
+                      <a:alpha val="43137"/>
+                    </a:srgbClr>
+                  </a:outerShdw>
+                </a:effectLst>
+              </a:rPr>
+              <a:t> для последовательностей и кортежей имеют одинаковую степень </a:t>
+            </a:r>
+            <a:r>
+              <a:rPr lang="en-US" dirty="0">
+                <a:effectLst>
+                  <a:outerShdw blurRad="38100" dist="38100" dir="2700000" algn="tl">
+                    <a:srgbClr val="000000">
+                      <a:alpha val="43137"/>
+                    </a:srgbClr>
+                  </a:outerShdw>
+                </a:effectLst>
+              </a:rPr>
+              <a:t>“</a:t>
+            </a:r>
+            <a:r>
+              <a:rPr lang="ru-RU" dirty="0">
+                <a:effectLst>
+                  <a:outerShdw blurRad="38100" dist="38100" dir="2700000" algn="tl">
+                    <a:srgbClr val="000000">
+                      <a:alpha val="43137"/>
+                    </a:srgbClr>
+                  </a:outerShdw>
+                </a:effectLst>
+              </a:rPr>
+              <a:t>гибкости</a:t>
+            </a:r>
+            <a:r>
+              <a:rPr lang="en-US" dirty="0">
+                <a:effectLst>
+                  <a:outerShdw blurRad="38100" dist="38100" dir="2700000" algn="tl">
+                    <a:srgbClr val="000000">
+                      <a:alpha val="43137"/>
+                    </a:srgbClr>
+                  </a:outerShdw>
+                </a:effectLst>
+              </a:rPr>
+              <a:t>”</a:t>
+            </a:r>
+            <a:r>
+              <a:rPr lang="ru-RU" dirty="0">
+                <a:effectLst>
+                  <a:outerShdw blurRad="38100" dist="38100" dir="2700000" algn="tl">
+                    <a:srgbClr val="000000">
+                      <a:alpha val="43137"/>
+                    </a:srgbClr>
+                  </a:outerShdw>
+                </a:effectLst>
+              </a:rPr>
+              <a:t>.</a:t>
             </a:r>
             <a:endParaRPr lang="en-US" dirty="0">
               <a:effectLst>
@@ -13830,8 +14679,8 @@
         </p:nvSpPr>
         <p:spPr>
           <a:xfrm>
-            <a:off x="2740517" y="2922432"/>
-            <a:ext cx="6710966" cy="369332"/>
+            <a:off x="3085327" y="3242112"/>
+            <a:ext cx="6021346" cy="369332"/>
           </a:xfrm>
           <a:prstGeom prst="rect">
             <a:avLst/>
@@ -13895,6 +14744,18 @@
           <a:p>
             <a:pPr algn="ctr"/>
             <a:r>
+              <a:rPr lang="ru-RU" b="1" dirty="0">
+                <a:effectLst>
+                  <a:outerShdw blurRad="38100" dist="38100" dir="2700000" algn="tl">
+                    <a:srgbClr val="000000">
+                      <a:alpha val="43137"/>
+                    </a:srgbClr>
+                  </a:outerShdw>
+                </a:effectLst>
+              </a:rPr>
+              <a:t>Возможности </a:t>
+            </a:r>
+            <a:r>
               <a:rPr lang="en-US" b="1" dirty="0">
                 <a:effectLst>
                   <a:outerShdw blurRad="38100" dist="38100" dir="2700000" algn="tl">
@@ -13904,7 +14765,7 @@
                   </a:outerShdw>
                 </a:effectLst>
               </a:rPr>
-              <a:t>Caution: </a:t>
+              <a:t>ABCNET </a:t>
             </a:r>
             <a:r>
               <a:rPr lang="ru-RU" b="1" dirty="0">
@@ -13916,7 +14777,19 @@
                   </a:outerShdw>
                 </a:effectLst>
               </a:rPr>
-              <a:t>Функционал </a:t>
+              <a:t>во многом богаче, чем </a:t>
+            </a:r>
+            <a:r>
+              <a:rPr lang="en-US" b="1" dirty="0" err="1">
+                <a:effectLst>
+                  <a:outerShdw blurRad="38100" dist="38100" dir="2700000" algn="tl">
+                    <a:srgbClr val="000000">
+                      <a:alpha val="43137"/>
+                    </a:srgbClr>
+                  </a:outerShdw>
+                </a:effectLst>
+              </a:rPr>
+              <a:t>PABCSystem</a:t>
             </a:r>
             <a:r>
               <a:rPr lang="en-US" b="1" dirty="0">
@@ -13928,43 +14801,54 @@
                   </a:outerShdw>
                 </a:effectLst>
               </a:rPr>
-              <a:t>ABCNET </a:t>
-            </a:r>
-            <a:r>
-              <a:rPr lang="ru-RU" b="1" dirty="0">
-                <a:effectLst>
-                  <a:outerShdw blurRad="38100" dist="38100" dir="2700000" algn="tl">
-                    <a:srgbClr val="000000">
-                      <a:alpha val="43137"/>
-                    </a:srgbClr>
-                  </a:outerShdw>
-                </a:effectLst>
-              </a:rPr>
-              <a:t>во многом богаче, чем </a:t>
-            </a:r>
-            <a:r>
-              <a:rPr lang="en-US" b="1" dirty="0" err="1">
-                <a:effectLst>
-                  <a:outerShdw blurRad="38100" dist="38100" dir="2700000" algn="tl">
-                    <a:srgbClr val="000000">
-                      <a:alpha val="43137"/>
-                    </a:srgbClr>
-                  </a:outerShdw>
-                </a:effectLst>
-              </a:rPr>
-              <a:t>PABCSystem</a:t>
-            </a:r>
-            <a:r>
-              <a:rPr lang="en-US" b="1" dirty="0">
-                <a:effectLst>
-                  <a:outerShdw blurRad="38100" dist="38100" dir="2700000" algn="tl">
-                    <a:srgbClr val="000000">
-                      <a:alpha val="43137"/>
-                    </a:srgbClr>
-                  </a:outerShdw>
-                </a:effectLst>
-              </a:rPr>
               <a:t>.</a:t>
+            </a:r>
+          </a:p>
+        </p:txBody>
+      </p:sp>
+      <p:sp>
+        <p:nvSpPr>
+          <p:cNvPr id="7" name="TextBox 6">
+            <a:extLst>
+              <a:ext uri="{FF2B5EF4-FFF2-40B4-BE49-F238E27FC236}">
+                <a16:creationId xmlns:a16="http://schemas.microsoft.com/office/drawing/2014/main" id="{27B0C485-570B-4DAE-8D26-9595DAC42072}"/>
+              </a:ext>
+            </a:extLst>
+          </p:cNvPr>
+          <p:cNvSpPr txBox="1"/>
+          <p:nvPr/>
+        </p:nvSpPr>
+        <p:spPr>
+          <a:xfrm>
+            <a:off x="0" y="6434138"/>
+            <a:ext cx="2292824" cy="369332"/>
+          </a:xfrm>
+          <a:prstGeom prst="rect">
+            <a:avLst/>
+          </a:prstGeom>
+          <a:noFill/>
+        </p:spPr>
+        <p:txBody>
+          <a:bodyPr wrap="square" rtlCol="0">
+            <a:spAutoFit/>
+          </a:bodyPr>
+          <a:lstStyle/>
+          <a:p>
+            <a:r>
+              <a:rPr lang="en-US" dirty="0" err="1">
+                <a:solidFill>
+                  <a:srgbClr val="99CCFF"/>
+                </a:solidFill>
+              </a:rPr>
+              <a:t>NETMouse</a:t>
+            </a:r>
+            <a:r>
+              <a:rPr lang="en-US" dirty="0">
+                <a:solidFill>
+                  <a:srgbClr val="99CCFF"/>
+                </a:solidFill>
+              </a:rPr>
+              <a:t> projects ©</a:t>
             </a:r>
           </a:p>
         </p:txBody>
@@ -14278,6 +15162,41 @@
                             </p:childTnLst>
                           </p:cTn>
                         </p:par>
+                        <p:par>
+                          <p:cTn id="22" fill="hold">
+                            <p:stCondLst>
+                              <p:cond delay="600"/>
+                            </p:stCondLst>
+                            <p:childTnLst>
+                              <p:par>
+                                <p:cTn id="23" presetID="26" presetClass="emph" presetSubtype="0" fill="hold" grpId="1" nodeType="afterEffect">
+                                  <p:stCondLst>
+                                    <p:cond delay="0"/>
+                                  </p:stCondLst>
+                                  <p:childTnLst>
+                                    <p:animEffect transition="out" filter="fade">
+                                      <p:cBhvr>
+                                        <p:cTn id="24" dur="500" tmFilter="0, 0; .2, .5; .8, .5; 1, 0"/>
+                                        <p:tgtEl>
+                                          <p:spTgt spid="12"/>
+                                        </p:tgtEl>
+                                      </p:cBhvr>
+                                    </p:animEffect>
+                                    <p:animScale>
+                                      <p:cBhvr>
+                                        <p:cTn id="25" dur="250" autoRev="1" fill="hold"/>
+                                        <p:tgtEl>
+                                          <p:spTgt spid="12"/>
+                                        </p:tgtEl>
+                                      </p:cBhvr>
+                                      <p:by x="105000" y="105000"/>
+                                    </p:animScale>
+                                  </p:childTnLst>
+                                </p:cTn>
+                              </p:par>
+                            </p:childTnLst>
+                          </p:cTn>
+                        </p:par>
                       </p:childTnLst>
                     </p:cTn>
                   </p:par>
@@ -14306,6 +15225,7 @@
       <p:bldP spid="10" grpId="0" animBg="1"/>
       <p:bldP spid="11" grpId="0" animBg="1"/>
       <p:bldP spid="12" grpId="0" animBg="1"/>
+      <p:bldP spid="12" grpId="1" animBg="1"/>
     </p:bldLst>
   </p:timing>
 </p:sld>
@@ -14775,6 +15695,53 @@
           </a:p>
         </p:txBody>
       </p:sp>
+      <p:sp>
+        <p:nvSpPr>
+          <p:cNvPr id="6" name="TextBox 5">
+            <a:extLst>
+              <a:ext uri="{FF2B5EF4-FFF2-40B4-BE49-F238E27FC236}">
+                <a16:creationId xmlns:a16="http://schemas.microsoft.com/office/drawing/2014/main" id="{AF8D0201-B9D0-42C8-9F6B-D47D5B5575C7}"/>
+              </a:ext>
+            </a:extLst>
+          </p:cNvPr>
+          <p:cNvSpPr txBox="1"/>
+          <p:nvPr/>
+        </p:nvSpPr>
+        <p:spPr>
+          <a:xfrm>
+            <a:off x="0" y="6434138"/>
+            <a:ext cx="2292824" cy="369332"/>
+          </a:xfrm>
+          <a:prstGeom prst="rect">
+            <a:avLst/>
+          </a:prstGeom>
+          <a:noFill/>
+        </p:spPr>
+        <p:txBody>
+          <a:bodyPr wrap="square" rtlCol="0">
+            <a:spAutoFit/>
+          </a:bodyPr>
+          <a:lstStyle/>
+          <a:p>
+            <a:r>
+              <a:rPr lang="en-US" dirty="0" err="1">
+                <a:solidFill>
+                  <a:srgbClr val="99CCFF"/>
+                </a:solidFill>
+              </a:rPr>
+              <a:t>NETMouse</a:t>
+            </a:r>
+            <a:r>
+              <a:rPr lang="en-US" dirty="0">
+                <a:solidFill>
+                  <a:srgbClr val="99CCFF"/>
+                </a:solidFill>
+              </a:rPr>
+              <a:t> projects ©</a:t>
+            </a:r>
+          </a:p>
+        </p:txBody>
+      </p:sp>
     </p:spTree>
     <p:extLst>
       <p:ext uri="{BB962C8B-B14F-4D97-AF65-F5344CB8AC3E}">
@@ -14785,14 +15752,14 @@
   <p:clrMapOvr>
     <a:masterClrMapping/>
   </p:clrMapOvr>
-  <mc:AlternateContent xmlns:mc="http://schemas.openxmlformats.org/markup-compatibility/2006" xmlns:p14="http://schemas.microsoft.com/office/powerpoint/2010/main">
-    <mc:Choice Requires="p14">
-      <p:transition spd="med" p14:dur="700">
-        <p:fade/>
+  <mc:AlternateContent xmlns:mc="http://schemas.openxmlformats.org/markup-compatibility/2006">
+    <mc:Choice xmlns:p14="http://schemas.microsoft.com/office/powerpoint/2010/main" Requires="p14">
+      <p:transition spd="slow" p14:dur="1250">
+        <p14:flip dir="r"/>
       </p:transition>
     </mc:Choice>
-    <mc:Fallback xmlns="">
-      <p:transition spd="med">
+    <mc:Fallback>
+      <p:transition spd="slow">
         <p:fade/>
       </p:transition>
     </mc:Fallback>

</xml_diff>